<commit_message>
Continued working on the demo for the FDA Submission.
</commit_message>
<xml_diff>
--- a/FDAPresentation.pptx
+++ b/FDAPresentation.pptx
@@ -229,7 +229,7 @@
           <a:p>
             <a:fld id="{F11BA5D4-47E9-45F7-9650-25C03F43394B}" type="datetimeFigureOut">
               <a:rPr lang="en-US" smtClean="0"/>
-              <a:t>7/12/2021</a:t>
+              <a:t>7/22/2021</a:t>
             </a:fld>
             <a:endParaRPr lang="en-US"/>
           </a:p>
@@ -1104,7 +1104,7 @@
           <a:p>
             <a:fld id="{C9115477-E791-443D-94C4-175269EE6F8E}" type="datetimeFigureOut">
               <a:rPr lang="en-US" smtClean="0"/>
-              <a:t>7/12/2021</a:t>
+              <a:t>7/22/2021</a:t>
             </a:fld>
             <a:endParaRPr lang="en-US"/>
           </a:p>
@@ -1442,7 +1442,7 @@
           <a:p>
             <a:fld id="{C9115477-E791-443D-94C4-175269EE6F8E}" type="datetimeFigureOut">
               <a:rPr lang="en-US" smtClean="0"/>
-              <a:t>7/12/2021</a:t>
+              <a:t>7/22/2021</a:t>
             </a:fld>
             <a:endParaRPr lang="en-US"/>
           </a:p>
@@ -1843,7 +1843,7 @@
           <a:p>
             <a:fld id="{C9115477-E791-443D-94C4-175269EE6F8E}" type="datetimeFigureOut">
               <a:rPr lang="en-US" smtClean="0"/>
-              <a:t>7/12/2021</a:t>
+              <a:t>7/22/2021</a:t>
             </a:fld>
             <a:endParaRPr lang="en-US"/>
           </a:p>
@@ -2179,7 +2179,7 @@
           <a:p>
             <a:fld id="{C9115477-E791-443D-94C4-175269EE6F8E}" type="datetimeFigureOut">
               <a:rPr lang="en-US" smtClean="0"/>
-              <a:t>7/12/2021</a:t>
+              <a:t>7/22/2021</a:t>
             </a:fld>
             <a:endParaRPr lang="en-US"/>
           </a:p>
@@ -2499,7 +2499,7 @@
           <a:p>
             <a:fld id="{C9115477-E791-443D-94C4-175269EE6F8E}" type="datetimeFigureOut">
               <a:rPr lang="en-US" smtClean="0"/>
-              <a:t>7/12/2021</a:t>
+              <a:t>7/22/2021</a:t>
             </a:fld>
             <a:endParaRPr lang="en-US"/>
           </a:p>
@@ -2895,7 +2895,7 @@
           <a:p>
             <a:fld id="{C9115477-E791-443D-94C4-175269EE6F8E}" type="datetimeFigureOut">
               <a:rPr lang="en-US" smtClean="0"/>
-              <a:t>7/12/2021</a:t>
+              <a:t>7/22/2021</a:t>
             </a:fld>
             <a:endParaRPr lang="en-US"/>
           </a:p>
@@ -3152,7 +3152,7 @@
           <a:p>
             <a:fld id="{C9115477-E791-443D-94C4-175269EE6F8E}" type="datetimeFigureOut">
               <a:rPr lang="en-US" smtClean="0"/>
-              <a:t>7/12/2021</a:t>
+              <a:t>7/22/2021</a:t>
             </a:fld>
             <a:endParaRPr lang="en-US"/>
           </a:p>
@@ -3414,7 +3414,7 @@
           <a:p>
             <a:fld id="{C9115477-E791-443D-94C4-175269EE6F8E}" type="datetimeFigureOut">
               <a:rPr lang="en-US" smtClean="0"/>
-              <a:t>7/12/2021</a:t>
+              <a:t>7/22/2021</a:t>
             </a:fld>
             <a:endParaRPr lang="en-US"/>
           </a:p>
@@ -3676,7 +3676,7 @@
           <a:p>
             <a:fld id="{C9115477-E791-443D-94C4-175269EE6F8E}" type="datetimeFigureOut">
               <a:rPr lang="en-US" smtClean="0"/>
-              <a:t>7/12/2021</a:t>
+              <a:t>7/22/2021</a:t>
             </a:fld>
             <a:endParaRPr lang="en-US"/>
           </a:p>
@@ -4005,7 +4005,7 @@
           <a:p>
             <a:fld id="{C9115477-E791-443D-94C4-175269EE6F8E}" type="datetimeFigureOut">
               <a:rPr lang="en-US" smtClean="0"/>
-              <a:t>7/12/2021</a:t>
+              <a:t>7/22/2021</a:t>
             </a:fld>
             <a:endParaRPr lang="en-US"/>
           </a:p>
@@ -4328,7 +4328,7 @@
           <a:p>
             <a:fld id="{C9115477-E791-443D-94C4-175269EE6F8E}" type="datetimeFigureOut">
               <a:rPr lang="en-US" smtClean="0"/>
-              <a:t>7/12/2021</a:t>
+              <a:t>7/22/2021</a:t>
             </a:fld>
             <a:endParaRPr lang="en-US"/>
           </a:p>
@@ -4785,7 +4785,7 @@
           <a:p>
             <a:fld id="{C9115477-E791-443D-94C4-175269EE6F8E}" type="datetimeFigureOut">
               <a:rPr lang="en-US" smtClean="0"/>
-              <a:t>7/12/2021</a:t>
+              <a:t>7/22/2021</a:t>
             </a:fld>
             <a:endParaRPr lang="en-US"/>
           </a:p>
@@ -4990,7 +4990,7 @@
           <a:p>
             <a:fld id="{C9115477-E791-443D-94C4-175269EE6F8E}" type="datetimeFigureOut">
               <a:rPr lang="en-US" smtClean="0"/>
-              <a:t>7/12/2021</a:t>
+              <a:t>7/22/2021</a:t>
             </a:fld>
             <a:endParaRPr lang="en-US"/>
           </a:p>
@@ -5167,7 +5167,7 @@
           <a:p>
             <a:fld id="{C9115477-E791-443D-94C4-175269EE6F8E}" type="datetimeFigureOut">
               <a:rPr lang="en-US" smtClean="0"/>
-              <a:t>7/12/2021</a:t>
+              <a:t>7/22/2021</a:t>
             </a:fld>
             <a:endParaRPr lang="en-US"/>
           </a:p>
@@ -5500,7 +5500,7 @@
           <a:p>
             <a:fld id="{C9115477-E791-443D-94C4-175269EE6F8E}" type="datetimeFigureOut">
               <a:rPr lang="en-US" smtClean="0"/>
-              <a:t>7/12/2021</a:t>
+              <a:t>7/22/2021</a:t>
             </a:fld>
             <a:endParaRPr lang="en-US"/>
           </a:p>
@@ -5845,7 +5845,7 @@
           <a:p>
             <a:fld id="{C9115477-E791-443D-94C4-175269EE6F8E}" type="datetimeFigureOut">
               <a:rPr lang="en-US" smtClean="0"/>
-              <a:t>7/12/2021</a:t>
+              <a:t>7/22/2021</a:t>
             </a:fld>
             <a:endParaRPr lang="en-US"/>
           </a:p>
@@ -7962,7 +7962,7 @@
           <a:p>
             <a:fld id="{C9115477-E791-443D-94C4-175269EE6F8E}" type="datetimeFigureOut">
               <a:rPr lang="en-US" smtClean="0"/>
-              <a:t>7/12/2021</a:t>
+              <a:t>7/22/2021</a:t>
             </a:fld>
             <a:endParaRPr lang="en-US"/>
           </a:p>
@@ -8780,7 +8780,12 @@
             <p:ph idx="1"/>
           </p:nvPr>
         </p:nvSpPr>
-        <p:spPr/>
+        <p:spPr>
+          <a:xfrm>
+            <a:off x="2592925" y="1406013"/>
+            <a:ext cx="8915400" cy="3777622"/>
+          </a:xfrm>
+        </p:spPr>
         <p:txBody>
           <a:bodyPr/>
           <a:lstStyle/>
@@ -8792,6 +8797,16 @@
             <a:r>
               <a:rPr lang="en-US" dirty="0"/>
               <a:t>We plan to continue assisting the industry in enabling interoperability by providing software and programming APIs that reduce the cost of implementing standards while also increasing the consistency in which those standards are implemented.</a:t>
+            </a:r>
+          </a:p>
+          <a:p>
+            <a:pPr>
+              <a:buFontTx/>
+              <a:buChar char="-"/>
+            </a:pPr>
+            <a:r>
+              <a:rPr lang="en-US" dirty="0"/>
+              <a:t>We believe having a standardized interface to query for traceability data for across numerous applications will allow for the development of analytics tools that can be built to talk to platforms storing traceability data through the Trace Driver. We plan on working with data scientists to help develop tools for the industry.</a:t>
             </a:r>
           </a:p>
         </p:txBody>
@@ -8954,7 +8969,7 @@
         </p:nvSpPr>
         <p:spPr>
           <a:xfrm>
-            <a:off x="2660902" y="3550458"/>
+            <a:off x="2389152" y="3543167"/>
             <a:ext cx="1006547" cy="910333"/>
           </a:xfrm>
           <a:prstGeom prst="flowChartConnector">
@@ -9150,7 +9165,7 @@
         </p:nvSpPr>
         <p:spPr>
           <a:xfrm>
-            <a:off x="4721142" y="3520815"/>
+            <a:off x="5008104" y="3520815"/>
             <a:ext cx="1006547" cy="910333"/>
           </a:xfrm>
           <a:prstGeom prst="flowChartConnector">
@@ -9296,8 +9311,8 @@
         </p:nvCxnSpPr>
         <p:spPr>
           <a:xfrm flipH="1">
-            <a:off x="3667449" y="3389337"/>
-            <a:ext cx="851422" cy="616288"/>
+            <a:off x="3395699" y="3389337"/>
+            <a:ext cx="1123172" cy="608997"/>
           </a:xfrm>
           <a:prstGeom prst="straightConnector1">
             <a:avLst/>
@@ -9383,7 +9398,7 @@
         <p:spPr>
           <a:xfrm>
             <a:off x="4518871" y="3389337"/>
-            <a:ext cx="202271" cy="586645"/>
+            <a:ext cx="489233" cy="586645"/>
           </a:xfrm>
           <a:prstGeom prst="straightConnector1">
             <a:avLst/>
@@ -9468,8 +9483,8 @@
         </p:nvCxnSpPr>
         <p:spPr>
           <a:xfrm flipH="1" flipV="1">
-            <a:off x="3667449" y="4005625"/>
-            <a:ext cx="815245" cy="558838"/>
+            <a:off x="3395699" y="3998334"/>
+            <a:ext cx="1086995" cy="566129"/>
           </a:xfrm>
           <a:prstGeom prst="straightConnector1">
             <a:avLst/>
@@ -9555,7 +9570,7 @@
         <p:spPr>
           <a:xfrm flipV="1">
             <a:off x="4482694" y="3975982"/>
-            <a:ext cx="238448" cy="588481"/>
+            <a:ext cx="525410" cy="588481"/>
           </a:xfrm>
           <a:prstGeom prst="straightConnector1">
             <a:avLst/>
@@ -9597,8 +9612,8 @@
         </p:nvCxnSpPr>
         <p:spPr>
           <a:xfrm>
-            <a:off x="3667449" y="4005625"/>
-            <a:ext cx="336117" cy="599869"/>
+            <a:off x="3395699" y="3998334"/>
+            <a:ext cx="607867" cy="607160"/>
           </a:xfrm>
           <a:prstGeom prst="straightConnector1">
             <a:avLst/>
@@ -9640,8 +9655,8 @@
         </p:nvCxnSpPr>
         <p:spPr>
           <a:xfrm flipV="1">
-            <a:off x="3667449" y="3391173"/>
-            <a:ext cx="186703" cy="614452"/>
+            <a:off x="3395699" y="3391173"/>
+            <a:ext cx="458453" cy="607161"/>
           </a:xfrm>
           <a:prstGeom prst="straightConnector1">
             <a:avLst/>
@@ -9683,8 +9698,8 @@
         </p:nvCxnSpPr>
         <p:spPr>
           <a:xfrm flipV="1">
-            <a:off x="3667449" y="3975982"/>
-            <a:ext cx="1053693" cy="29643"/>
+            <a:off x="3395699" y="3975982"/>
+            <a:ext cx="1612405" cy="22352"/>
           </a:xfrm>
           <a:prstGeom prst="straightConnector1">
             <a:avLst/>
@@ -9727,7 +9742,7 @@
         <p:spPr>
           <a:xfrm flipV="1">
             <a:off x="4003566" y="3975982"/>
-            <a:ext cx="717576" cy="629512"/>
+            <a:ext cx="1004538" cy="629512"/>
           </a:xfrm>
           <a:prstGeom prst="straightConnector1">
             <a:avLst/>
@@ -9769,8 +9784,8 @@
         </p:nvCxnSpPr>
         <p:spPr>
           <a:xfrm flipH="1" flipV="1">
-            <a:off x="3667449" y="4005625"/>
-            <a:ext cx="336117" cy="599869"/>
+            <a:off x="3395699" y="3998334"/>
+            <a:ext cx="607867" cy="607160"/>
           </a:xfrm>
           <a:prstGeom prst="straightConnector1">
             <a:avLst/>
@@ -9856,7 +9871,7 @@
         <p:spPr>
           <a:xfrm>
             <a:off x="3854152" y="3391173"/>
-            <a:ext cx="866990" cy="584809"/>
+            <a:ext cx="1153952" cy="584809"/>
           </a:xfrm>
           <a:prstGeom prst="straightConnector1">
             <a:avLst/>
@@ -9898,8 +9913,8 @@
         </p:nvCxnSpPr>
         <p:spPr>
           <a:xfrm flipH="1">
-            <a:off x="3667449" y="3391173"/>
-            <a:ext cx="186703" cy="614452"/>
+            <a:off x="3395699" y="3391173"/>
+            <a:ext cx="458453" cy="607161"/>
           </a:xfrm>
           <a:prstGeom prst="straightConnector1">
             <a:avLst/>
@@ -9980,7 +9995,7 @@
         </p:nvSpPr>
         <p:spPr>
           <a:xfrm>
-            <a:off x="6509126" y="3591780"/>
+            <a:off x="6503884" y="3439672"/>
             <a:ext cx="1006547" cy="910333"/>
           </a:xfrm>
           <a:prstGeom prst="flowChartConnector">
@@ -10030,7 +10045,7 @@
         </p:nvSpPr>
         <p:spPr>
           <a:xfrm>
-            <a:off x="6940736" y="2725107"/>
+            <a:off x="6928563" y="2514066"/>
             <a:ext cx="1006547" cy="910333"/>
           </a:xfrm>
           <a:prstGeom prst="flowChartConnector">
@@ -10080,7 +10095,7 @@
         </p:nvSpPr>
         <p:spPr>
           <a:xfrm>
-            <a:off x="6916930" y="4531766"/>
+            <a:off x="6911688" y="4379658"/>
             <a:ext cx="1006547" cy="910333"/>
           </a:xfrm>
           <a:prstGeom prst="flowChartConnector">
@@ -10130,7 +10145,7 @@
         </p:nvSpPr>
         <p:spPr>
           <a:xfrm>
-            <a:off x="8671332" y="4473187"/>
+            <a:off x="8777377" y="4390874"/>
             <a:ext cx="1071318" cy="968912"/>
           </a:xfrm>
           <a:prstGeom prst="flowChartConnector">
@@ -10180,7 +10195,7 @@
         </p:nvSpPr>
         <p:spPr>
           <a:xfrm>
-            <a:off x="9106407" y="3575129"/>
+            <a:off x="9101165" y="3423021"/>
             <a:ext cx="1006547" cy="910333"/>
           </a:xfrm>
           <a:prstGeom prst="flowChartConnector">
@@ -10230,7 +10245,7 @@
         </p:nvSpPr>
         <p:spPr>
           <a:xfrm>
-            <a:off x="8552167" y="2682018"/>
+            <a:off x="8546925" y="2529910"/>
             <a:ext cx="1006547" cy="910333"/>
           </a:xfrm>
           <a:prstGeom prst="flowChartConnector">
@@ -10280,7 +10295,7 @@
         </p:nvSpPr>
         <p:spPr>
           <a:xfrm>
-            <a:off x="7858295" y="3597870"/>
+            <a:off x="7853053" y="3445762"/>
             <a:ext cx="872633" cy="864853"/>
           </a:xfrm>
           <a:prstGeom prst="ellipse">
@@ -10309,7 +10324,7 @@
           <a:p>
             <a:pPr algn="ctr"/>
             <a:r>
-              <a:rPr lang="en-US" sz="700" dirty="0">
+              <a:rPr lang="en-US" sz="600" dirty="0">
                 <a:solidFill>
                   <a:schemeClr val="tx1"/>
                 </a:solidFill>
@@ -10337,7 +10352,7 @@
         </p:nvCxnSpPr>
         <p:spPr>
           <a:xfrm flipH="1">
-            <a:off x="8603134" y="3459036"/>
+            <a:off x="8597892" y="3306928"/>
             <a:ext cx="96438" cy="265489"/>
           </a:xfrm>
           <a:prstGeom prst="straightConnector1">
@@ -10380,8 +10395,8 @@
         </p:nvCxnSpPr>
         <p:spPr>
           <a:xfrm>
-            <a:off x="7799878" y="3502125"/>
-            <a:ext cx="186211" cy="222400"/>
+            <a:off x="7787705" y="3291084"/>
+            <a:ext cx="193142" cy="281333"/>
           </a:xfrm>
           <a:prstGeom prst="straightConnector1">
             <a:avLst/>
@@ -10423,7 +10438,7 @@
         </p:nvCxnSpPr>
         <p:spPr>
           <a:xfrm flipV="1">
-            <a:off x="7515673" y="4030297"/>
+            <a:off x="7510431" y="3878189"/>
             <a:ext cx="342622" cy="16650"/>
           </a:xfrm>
           <a:prstGeom prst="straightConnector1">
@@ -10466,7 +10481,7 @@
         </p:nvCxnSpPr>
         <p:spPr>
           <a:xfrm flipV="1">
-            <a:off x="7776072" y="4336068"/>
+            <a:off x="7770830" y="4183960"/>
             <a:ext cx="210017" cy="329013"/>
           </a:xfrm>
           <a:prstGeom prst="straightConnector1">
@@ -10509,8 +10524,8 @@
         </p:nvCxnSpPr>
         <p:spPr>
           <a:xfrm flipH="1" flipV="1">
-            <a:off x="8603134" y="4336068"/>
-            <a:ext cx="225089" cy="279013"/>
+            <a:off x="8597892" y="4183960"/>
+            <a:ext cx="336376" cy="348808"/>
           </a:xfrm>
           <a:prstGeom prst="straightConnector1">
             <a:avLst/>
@@ -10552,7 +10567,7 @@
         </p:nvCxnSpPr>
         <p:spPr>
           <a:xfrm flipH="1">
-            <a:off x="8730928" y="4030296"/>
+            <a:off x="8725686" y="3878188"/>
             <a:ext cx="375479" cy="1"/>
           </a:xfrm>
           <a:prstGeom prst="straightConnector1">
@@ -10595,7 +10610,7 @@
         </p:nvCxnSpPr>
         <p:spPr>
           <a:xfrm flipH="1">
-            <a:off x="7776072" y="4336068"/>
+            <a:off x="7770830" y="4183960"/>
             <a:ext cx="210017" cy="329013"/>
           </a:xfrm>
           <a:prstGeom prst="straightConnector1">
@@ -10638,8 +10653,8 @@
         </p:nvCxnSpPr>
         <p:spPr>
           <a:xfrm>
-            <a:off x="8603134" y="4336068"/>
-            <a:ext cx="225089" cy="279013"/>
+            <a:off x="8597892" y="4183960"/>
+            <a:ext cx="336376" cy="348808"/>
           </a:xfrm>
           <a:prstGeom prst="straightConnector1">
             <a:avLst/>
@@ -10681,7 +10696,7 @@
         </p:nvCxnSpPr>
         <p:spPr>
           <a:xfrm flipV="1">
-            <a:off x="8730928" y="4030296"/>
+            <a:off x="8725686" y="3878188"/>
             <a:ext cx="375479" cy="1"/>
           </a:xfrm>
           <a:prstGeom prst="straightConnector1">
@@ -10724,7 +10739,7 @@
         </p:nvCxnSpPr>
         <p:spPr>
           <a:xfrm flipV="1">
-            <a:off x="8603134" y="3459036"/>
+            <a:off x="8597892" y="3306928"/>
             <a:ext cx="96438" cy="265489"/>
           </a:xfrm>
           <a:prstGeom prst="straightConnector1">
@@ -10767,8 +10782,8 @@
         </p:nvCxnSpPr>
         <p:spPr>
           <a:xfrm flipH="1" flipV="1">
-            <a:off x="7799878" y="3502125"/>
-            <a:ext cx="186211" cy="222400"/>
+            <a:off x="7787705" y="3291084"/>
+            <a:ext cx="193142" cy="281333"/>
           </a:xfrm>
           <a:prstGeom prst="straightConnector1">
             <a:avLst/>
@@ -10898,7 +10913,7 @@
         </p:nvSpPr>
         <p:spPr>
           <a:xfrm>
-            <a:off x="6916930" y="1905000"/>
+            <a:off x="7048768" y="1903956"/>
             <a:ext cx="2682145" cy="646331"/>
           </a:xfrm>
           <a:prstGeom prst="rect">
@@ -11185,7 +11200,7 @@
         </p:nvSpPr>
         <p:spPr>
           <a:xfrm>
-            <a:off x="2278734" y="3288563"/>
+            <a:off x="2278734" y="2562867"/>
             <a:ext cx="8915400" cy="1280890"/>
           </a:xfrm>
         </p:spPr>
@@ -11195,25 +11210,25 @@
           </a:bodyPr>
           <a:lstStyle/>
           <a:p>
-            <a:pPr marL="0" indent="0">
+            <a:pPr marL="0" indent="0" algn="ctr">
               <a:buNone/>
             </a:pPr>
             <a:r>
-              <a:rPr lang="en-US" dirty="0"/>
+              <a:rPr lang="en-US" sz="1400" dirty="0"/>
               <a:t>The Traceability Driver was developed to reduce the cost of interoperability. It’s an addon service that can be installed onto existing traceability solutions with minimum work and enables any traceability solution to interoperate with all other traceability solutions that install the Traceability Driver.</a:t>
             </a:r>
           </a:p>
           <a:p>
-            <a:pPr marL="0" indent="0">
+            <a:pPr marL="0" indent="0" algn="ctr">
               <a:buNone/>
             </a:pPr>
-            <a:endParaRPr lang="en-US" dirty="0"/>
-          </a:p>
-          <a:p>
-            <a:pPr marL="0" indent="0">
+            <a:endParaRPr lang="en-US" sz="1400" dirty="0"/>
+          </a:p>
+          <a:p>
+            <a:pPr marL="0" indent="0" algn="ctr">
               <a:buNone/>
             </a:pPr>
-            <a:endParaRPr lang="en-US" dirty="0"/>
+            <a:endParaRPr lang="en-US" sz="1400" dirty="0"/>
           </a:p>
         </p:txBody>
       </p:sp>
@@ -11244,7 +11259,7 @@
         </p:blipFill>
         <p:spPr>
           <a:xfrm>
-            <a:off x="4426330" y="386836"/>
+            <a:off x="4485324" y="-253609"/>
             <a:ext cx="4086808" cy="3109755"/>
           </a:xfrm>
           <a:prstGeom prst="rect">
@@ -11299,8 +11314,8 @@
         </p:nvSpPr>
         <p:spPr>
           <a:xfrm>
-            <a:off x="3276868" y="4831368"/>
-            <a:ext cx="7467332" cy="1384995"/>
+            <a:off x="2279002" y="3770579"/>
+            <a:ext cx="8915132" cy="830997"/>
           </a:xfrm>
           <a:prstGeom prst="rect">
             <a:avLst/>
@@ -11313,13 +11328,122 @@
           </a:bodyPr>
           <a:lstStyle/>
           <a:p>
-            <a:r>
-              <a:rPr lang="en-US" sz="2800" i="1" dirty="0"/>
-              <a:t>“Food companies are drowning in traceability solution options but are starving for interoperability.”</a:t>
-            </a:r>
-          </a:p>
-        </p:txBody>
-      </p:sp>
+            <a:pPr algn="ctr"/>
+            <a:r>
+              <a:rPr lang="en-US" sz="2400" i="1" dirty="0"/>
+              <a:t>Food companies are drowning in traceability solution options but are starving for interoperability.</a:t>
+            </a:r>
+          </a:p>
+        </p:txBody>
+      </p:sp>
+      <p:pic>
+        <p:nvPicPr>
+          <p:cNvPr id="7" name="Picture 6" descr="Diagram&#10;&#10;Description automatically generated">
+            <a:extLst>
+              <a:ext uri="{FF2B5EF4-FFF2-40B4-BE49-F238E27FC236}">
+                <a16:creationId xmlns:a16="http://schemas.microsoft.com/office/drawing/2014/main" id="{4D24778D-B9E4-4867-A2FE-51B1DBC7925E}"/>
+              </a:ext>
+            </a:extLst>
+          </p:cNvPr>
+          <p:cNvPicPr>
+            <a:picLocks noChangeAspect="1"/>
+          </p:cNvPicPr>
+          <p:nvPr/>
+        </p:nvPicPr>
+        <p:blipFill>
+          <a:blip r:embed="rId4">
+            <a:extLst>
+              <a:ext uri="{28A0092B-C50C-407E-A947-70E740481C1C}">
+                <a14:useLocalDpi xmlns:a14="http://schemas.microsoft.com/office/drawing/2010/main" val="0"/>
+              </a:ext>
+            </a:extLst>
+          </a:blip>
+          <a:stretch>
+            <a:fillRect/>
+          </a:stretch>
+        </p:blipFill>
+        <p:spPr>
+          <a:xfrm>
+            <a:off x="7052187" y="5238854"/>
+            <a:ext cx="1818324" cy="1818324"/>
+          </a:xfrm>
+          <a:prstGeom prst="rect">
+            <a:avLst/>
+          </a:prstGeom>
+        </p:spPr>
+      </p:pic>
+      <p:sp>
+        <p:nvSpPr>
+          <p:cNvPr id="10" name="TextBox 9">
+            <a:extLst>
+              <a:ext uri="{FF2B5EF4-FFF2-40B4-BE49-F238E27FC236}">
+                <a16:creationId xmlns:a16="http://schemas.microsoft.com/office/drawing/2014/main" id="{25223A08-EA37-45D3-85DE-12CE1B14B98B}"/>
+              </a:ext>
+            </a:extLst>
+          </p:cNvPr>
+          <p:cNvSpPr txBox="1"/>
+          <p:nvPr/>
+        </p:nvSpPr>
+        <p:spPr>
+          <a:xfrm>
+            <a:off x="2279002" y="4929449"/>
+            <a:ext cx="8915132" cy="523220"/>
+          </a:xfrm>
+          <a:prstGeom prst="rect">
+            <a:avLst/>
+          </a:prstGeom>
+          <a:noFill/>
+        </p:spPr>
+        <p:txBody>
+          <a:bodyPr wrap="square" rtlCol="0">
+            <a:spAutoFit/>
+          </a:bodyPr>
+          <a:lstStyle/>
+          <a:p>
+            <a:pPr algn="ctr"/>
+            <a:r>
+              <a:rPr lang="en-US" sz="1400" b="1" i="1" dirty="0"/>
+              <a:t>Below are companies that have already implemented or are currently working to implement the Traceability Driver…</a:t>
+            </a:r>
+          </a:p>
+        </p:txBody>
+      </p:sp>
+      <p:pic>
+        <p:nvPicPr>
+          <p:cNvPr id="12" name="Picture 11" descr="Logo&#10;&#10;Description automatically generated">
+            <a:extLst>
+              <a:ext uri="{FF2B5EF4-FFF2-40B4-BE49-F238E27FC236}">
+                <a16:creationId xmlns:a16="http://schemas.microsoft.com/office/drawing/2014/main" id="{15AF1F6D-705D-44F9-BB65-7DDD8D9AB791}"/>
+              </a:ext>
+            </a:extLst>
+          </p:cNvPr>
+          <p:cNvPicPr>
+            <a:picLocks noChangeAspect="1"/>
+          </p:cNvPicPr>
+          <p:nvPr/>
+        </p:nvPicPr>
+        <p:blipFill>
+          <a:blip r:embed="rId5">
+            <a:extLst>
+              <a:ext uri="{28A0092B-C50C-407E-A947-70E740481C1C}">
+                <a14:useLocalDpi xmlns:a14="http://schemas.microsoft.com/office/drawing/2010/main" val="0"/>
+              </a:ext>
+            </a:extLst>
+          </a:blip>
+          <a:stretch>
+            <a:fillRect/>
+          </a:stretch>
+        </p:blipFill>
+        <p:spPr>
+          <a:xfrm>
+            <a:off x="3293915" y="5896585"/>
+            <a:ext cx="3234813" cy="502862"/>
+          </a:xfrm>
+          <a:prstGeom prst="rect">
+            <a:avLst/>
+          </a:prstGeom>
+        </p:spPr>
+      </p:pic>
     </p:spTree>
     <p:extLst>
       <p:ext uri="{BB962C8B-B14F-4D97-AF65-F5344CB8AC3E}">
@@ -11402,13 +11526,26 @@
         </p:spPr>
         <p:txBody>
           <a:bodyPr>
-            <a:normAutofit/>
+            <a:normAutofit lnSpcReduction="10000"/>
           </a:bodyPr>
           <a:lstStyle/>
           <a:p>
             <a:r>
               <a:rPr lang="en-US" sz="1600" dirty="0"/>
-              <a:t>A software tool that can be used to make an existing traceability solution interoperable using the GS1 standards.</a:t>
+              <a:t>A software tool that can be used to make an existing traceability solution interoperable using the GDST and GS1 standards.</a:t>
+            </a:r>
+          </a:p>
+          <a:p>
+            <a:r>
+              <a:rPr lang="en-US" sz="1600" dirty="0"/>
+              <a:t>There are great standards for enabling interoperability such as GDST and GS1, this tool is meant to reduce development costs in implementing these standards.</a:t>
+            </a:r>
+          </a:p>
+          <a:p>
+            <a:pPr lvl="1"/>
+            <a:r>
+              <a:rPr lang="en-US" sz="1400" i="1" dirty="0"/>
+              <a:t>Sometimes these standards are interpreted differently by solution providers implementing them, leading to inconsistencies in how they are implemented. This tool would assist in ensuring the standards are implemented consistently.</a:t>
             </a:r>
           </a:p>
           <a:p>
@@ -11808,45 +11945,6 @@
             </a:p>
           </p:txBody>
         </p:sp>
-        <p:pic>
-          <p:nvPicPr>
-            <p:cNvPr id="11" name="Picture 10" descr="Shape&#10;&#10;Description automatically generated with low confidence">
-              <a:extLst>
-                <a:ext uri="{FF2B5EF4-FFF2-40B4-BE49-F238E27FC236}">
-                  <a16:creationId xmlns:a16="http://schemas.microsoft.com/office/drawing/2014/main" id="{75F7B00F-1827-4FDC-A7CB-EA0B4A344D3D}"/>
-                </a:ext>
-              </a:extLst>
-            </p:cNvPr>
-            <p:cNvPicPr>
-              <a:picLocks noChangeAspect="1"/>
-            </p:cNvPicPr>
-            <p:nvPr/>
-          </p:nvPicPr>
-          <p:blipFill>
-            <a:blip r:embed="rId2">
-              <a:extLst>
-                <a:ext uri="{28A0092B-C50C-407E-A947-70E740481C1C}">
-                  <a14:useLocalDpi xmlns:a14="http://schemas.microsoft.com/office/drawing/2010/main" val="0"/>
-                </a:ext>
-              </a:extLst>
-            </a:blip>
-            <a:stretch>
-              <a:fillRect/>
-            </a:stretch>
-          </p:blipFill>
-          <p:spPr>
-            <a:xfrm>
-              <a:off x="4093516" y="2584555"/>
-              <a:ext cx="670639" cy="670639"/>
-            </a:xfrm>
-            <a:prstGeom prst="rect">
-              <a:avLst/>
-            </a:prstGeom>
-            <a:solidFill>
-              <a:schemeClr val="bg1"/>
-            </a:solidFill>
-          </p:spPr>
-        </p:pic>
       </p:grpSp>
       <p:grpSp>
         <p:nvGrpSpPr>
@@ -12464,45 +12562,6 @@
             </a:p>
           </p:txBody>
         </p:sp>
-        <p:pic>
-          <p:nvPicPr>
-            <p:cNvPr id="26" name="Picture 25" descr="Shape&#10;&#10;Description automatically generated with low confidence">
-              <a:extLst>
-                <a:ext uri="{FF2B5EF4-FFF2-40B4-BE49-F238E27FC236}">
-                  <a16:creationId xmlns:a16="http://schemas.microsoft.com/office/drawing/2014/main" id="{6E88DB0F-CBDD-4EC4-9655-5BF5D5279D47}"/>
-                </a:ext>
-              </a:extLst>
-            </p:cNvPr>
-            <p:cNvPicPr>
-              <a:picLocks noChangeAspect="1"/>
-            </p:cNvPicPr>
-            <p:nvPr/>
-          </p:nvPicPr>
-          <p:blipFill>
-            <a:blip r:embed="rId2">
-              <a:extLst>
-                <a:ext uri="{28A0092B-C50C-407E-A947-70E740481C1C}">
-                  <a14:useLocalDpi xmlns:a14="http://schemas.microsoft.com/office/drawing/2010/main" val="0"/>
-                </a:ext>
-              </a:extLst>
-            </a:blip>
-            <a:stretch>
-              <a:fillRect/>
-            </a:stretch>
-          </p:blipFill>
-          <p:spPr>
-            <a:xfrm>
-              <a:off x="4093516" y="2584555"/>
-              <a:ext cx="670639" cy="670639"/>
-            </a:xfrm>
-            <a:prstGeom prst="rect">
-              <a:avLst/>
-            </a:prstGeom>
-            <a:solidFill>
-              <a:schemeClr val="bg1"/>
-            </a:solidFill>
-          </p:spPr>
-        </p:pic>
       </p:grpSp>
       <p:grpSp>
         <p:nvGrpSpPr>
@@ -13131,6 +13190,77 @@
           </a:p>
         </p:txBody>
       </p:sp>
+      <p:pic>
+        <p:nvPicPr>
+          <p:cNvPr id="38" name="Picture 37" descr="Logo&#10;&#10;Description automatically generated">
+            <a:extLst>
+              <a:ext uri="{FF2B5EF4-FFF2-40B4-BE49-F238E27FC236}">
+                <a16:creationId xmlns:a16="http://schemas.microsoft.com/office/drawing/2014/main" id="{6997122F-2308-4B94-A33B-3048516D3B46}"/>
+              </a:ext>
+            </a:extLst>
+          </p:cNvPr>
+          <p:cNvPicPr>
+            <a:picLocks noChangeAspect="1"/>
+          </p:cNvPicPr>
+          <p:nvPr/>
+        </p:nvPicPr>
+        <p:blipFill rotWithShape="1">
+          <a:blip r:embed="rId3">
+            <a:extLst>
+              <a:ext uri="{28A0092B-C50C-407E-A947-70E740481C1C}">
+                <a14:useLocalDpi xmlns:a14="http://schemas.microsoft.com/office/drawing/2010/main" val="0"/>
+              </a:ext>
+            </a:extLst>
+          </a:blip>
+          <a:srcRect t="353" r="73093"/>
+          <a:stretch/>
+        </p:blipFill>
+        <p:spPr>
+          <a:xfrm>
+            <a:off x="2543958" y="2206750"/>
+            <a:ext cx="1004620" cy="637057"/>
+          </a:xfrm>
+          <a:prstGeom prst="rect">
+            <a:avLst/>
+          </a:prstGeom>
+        </p:spPr>
+      </p:pic>
+      <p:pic>
+        <p:nvPicPr>
+          <p:cNvPr id="39" name="Picture 38" descr="Diagram&#10;&#10;Description automatically generated">
+            <a:extLst>
+              <a:ext uri="{FF2B5EF4-FFF2-40B4-BE49-F238E27FC236}">
+                <a16:creationId xmlns:a16="http://schemas.microsoft.com/office/drawing/2014/main" id="{989A85AF-2A01-4B43-BE39-55754950ABE0}"/>
+              </a:ext>
+            </a:extLst>
+          </p:cNvPr>
+          <p:cNvPicPr>
+            <a:picLocks noChangeAspect="1"/>
+          </p:cNvPicPr>
+          <p:nvPr/>
+        </p:nvPicPr>
+        <p:blipFill>
+          <a:blip r:embed="rId4">
+            <a:extLst>
+              <a:ext uri="{28A0092B-C50C-407E-A947-70E740481C1C}">
+                <a14:useLocalDpi xmlns:a14="http://schemas.microsoft.com/office/drawing/2010/main" val="0"/>
+              </a:ext>
+            </a:extLst>
+          </a:blip>
+          <a:stretch>
+            <a:fillRect/>
+          </a:stretch>
+        </p:blipFill>
+        <p:spPr>
+          <a:xfrm>
+            <a:off x="9329954" y="1964440"/>
+            <a:ext cx="1052273" cy="1052273"/>
+          </a:xfrm>
+          <a:prstGeom prst="rect">
+            <a:avLst/>
+          </a:prstGeom>
+        </p:spPr>
+      </p:pic>
     </p:spTree>
     <p:extLst>
       <p:ext uri="{BB962C8B-B14F-4D97-AF65-F5344CB8AC3E}">
@@ -13292,35 +13422,6 @@
               <a:rPr lang="en-US" sz="1400" dirty="0"/>
               <a:t>Currently most traceability solutions try to take a “one size fits all approach”.</a:t>
             </a:r>
-          </a:p>
-          <a:p>
-            <a:r>
-              <a:rPr lang="en-US" sz="1500" u="sng" dirty="0"/>
-              <a:t>Current approach to Interoperability is Costly if Not Impossible</a:t>
-            </a:r>
-          </a:p>
-          <a:p>
-            <a:pPr lvl="1"/>
-            <a:r>
-              <a:rPr lang="en-US" sz="1400" dirty="0"/>
-              <a:t>Requires consistent implementation of numerous standards.</a:t>
-            </a:r>
-          </a:p>
-          <a:p>
-            <a:pPr lvl="1"/>
-            <a:r>
-              <a:rPr lang="en-US" sz="1400" dirty="0"/>
-              <a:t>High degree of flexibility/complexity in EPCIS and other standards causes everyone to implement their own flavor.</a:t>
-            </a:r>
-          </a:p>
-          <a:p>
-            <a:pPr lvl="1"/>
-            <a:r>
-              <a:rPr lang="en-US" sz="1400" dirty="0"/>
-              <a:t>Interoperability turns into a problem that requires each traceability solution to have to do an integration project with every other traceability solution.</a:t>
-            </a:r>
-          </a:p>
-          <a:p>
             <a:endParaRPr lang="en-US" sz="1500" dirty="0">
               <a:solidFill>
                 <a:srgbClr val="1D1C1D"/>
@@ -13328,7 +13429,10 @@
             </a:endParaRPr>
           </a:p>
           <a:p>
-            <a:endParaRPr lang="en-US" sz="1500" dirty="0"/>
+            <a:r>
+              <a:rPr lang="en-US" sz="1500" dirty="0"/>
+              <a:t>There exists many great standards for interoperability such as GDST and EPCIS, however there is a need for software tools to assist in implementing these standards for traceability solution providers.</a:t>
+            </a:r>
           </a:p>
         </p:txBody>
       </p:sp>
@@ -13413,14 +13517,21 @@
             <p:ph idx="1"/>
           </p:nvPr>
         </p:nvSpPr>
-        <p:spPr/>
-        <p:txBody>
-          <a:bodyPr/>
+        <p:spPr>
+          <a:xfrm>
+            <a:off x="2589212" y="1818968"/>
+            <a:ext cx="8915400" cy="4729316"/>
+          </a:xfrm>
+        </p:spPr>
+        <p:txBody>
+          <a:bodyPr>
+            <a:normAutofit fontScale="92500" lnSpcReduction="20000"/>
+          </a:bodyPr>
           <a:lstStyle/>
           <a:p>
             <a:r>
-              <a:rPr lang="en-US" i="1" dirty="0"/>
-              <a:t>“Food companies are drowning in traceability solution options but are starving for interoperability.”</a:t>
+              <a:rPr lang="en-US" dirty="0"/>
+              <a:t>Food companies are drowning in traceability solution options but are starving for interoperability.</a:t>
             </a:r>
           </a:p>
           <a:p>
@@ -13438,6 +13549,12 @@
           <a:p>
             <a:r>
               <a:rPr lang="en-US" dirty="0"/>
+              <a:t>Utilizes existing data format and communication standards.</a:t>
+            </a:r>
+          </a:p>
+          <a:p>
+            <a:r>
+              <a:rPr lang="en-US" dirty="0"/>
               <a:t>Secured with HTTPS, internal checks, and Public/Private Key Encryption.</a:t>
             </a:r>
           </a:p>
@@ -13445,8 +13562,45 @@
             <a:pPr lvl="1"/>
             <a:r>
               <a:rPr lang="en-US" dirty="0"/>
-              <a:t>Even allows permissions of data on a Trading Party by Trading Party basis.</a:t>
-            </a:r>
+              <a:t>HTTPS to ensure communication is secured.</a:t>
+            </a:r>
+          </a:p>
+          <a:p>
+            <a:pPr lvl="1"/>
+            <a:r>
+              <a:rPr lang="en-US" dirty="0"/>
+              <a:t>Allows permissions of data on a Trading Party by Trading Party basis.</a:t>
+            </a:r>
+          </a:p>
+          <a:p>
+            <a:pPr lvl="1"/>
+            <a:r>
+              <a:rPr lang="en-US" dirty="0"/>
+              <a:t>Public / Private Key using Decentralized Identifiers (DID)</a:t>
+            </a:r>
+          </a:p>
+          <a:p>
+            <a:r>
+              <a:rPr lang="en-US" dirty="0"/>
+              <a:t>Network effect creates exponential value for traceability solutions who implement the Traceability Driver.</a:t>
+            </a:r>
+          </a:p>
+          <a:p>
+            <a:pPr lvl="1"/>
+            <a:r>
+              <a:rPr lang="en-US" sz="1400" dirty="0"/>
+              <a:t>Think social media like Facebook.</a:t>
+            </a:r>
+          </a:p>
+          <a:p>
+            <a:pPr lvl="1"/>
+            <a:r>
+              <a:rPr lang="en-US" sz="1400" dirty="0"/>
+              <a:t>Every time someone implements the Traceability Driver, it makes the network more valuable for them, and for all the previous traceability solutions who implemented the driver.</a:t>
+            </a:r>
+          </a:p>
+          <a:p>
+            <a:endParaRPr lang="en-US" dirty="0"/>
           </a:p>
         </p:txBody>
       </p:sp>
@@ -13544,36 +13698,15 @@
             </a:r>
           </a:p>
           <a:p>
-            <a:pPr lvl="1"/>
-            <a:r>
-              <a:rPr lang="en-US" sz="1400" dirty="0"/>
-              <a:t>Users then create a mapping between the provided common data model and their local data models.</a:t>
-            </a:r>
-          </a:p>
-          <a:p>
             <a:r>
               <a:rPr lang="en-US" dirty="0"/>
-              <a:t>The Traceability Driver dramatically reduces the effort to becoming interoperable while also dramatically increasing the consistency in which the interoperable standards are implemented.</a:t>
+              <a:t>Traceability Solution Providers just need to make a simple mapping between their local data model and the common data model provided.</a:t>
             </a:r>
           </a:p>
           <a:p>
             <a:r>
               <a:rPr lang="en-US" dirty="0"/>
-              <a:t>Network effect creates exponential value for traceability solutions who implement the Traceability Driver.</a:t>
-            </a:r>
-          </a:p>
-          <a:p>
-            <a:pPr lvl="1"/>
-            <a:r>
-              <a:rPr lang="en-US" sz="1400" dirty="0"/>
-              <a:t>Think social media like Facebook.</a:t>
-            </a:r>
-          </a:p>
-          <a:p>
-            <a:pPr lvl="1"/>
-            <a:r>
-              <a:rPr lang="en-US" sz="1400" dirty="0"/>
-              <a:t>Every time someone implements the Traceability Driver, it makes the network more valuable for them, and for all the previous traceability solutions who implemented the driver.</a:t>
+              <a:t>The Traceability Driver dramatically reduces the effort to becoming interoperable while also increasing the consistency in which the interoperable standards are implemented.</a:t>
             </a:r>
           </a:p>
           <a:p>
@@ -13675,20 +13808,20 @@
           <a:p>
             <a:r>
               <a:rPr lang="en-US" dirty="0"/>
-              <a:t>Reduces the cost of interoperability for solution providers.</a:t>
+              <a:t>Reduces the development costs of interoperability for solution providers.</a:t>
+            </a:r>
+          </a:p>
+          <a:p>
+            <a:r>
+              <a:rPr lang="en-US" dirty="0"/>
+              <a:t>Interoperability helps reduce costs for Food Companies</a:t>
             </a:r>
           </a:p>
           <a:p>
             <a:pPr lvl="1"/>
             <a:r>
               <a:rPr lang="en-US" dirty="0"/>
-              <a:t>So not only is it free, but it helps reduce costs for solution providers.</a:t>
-            </a:r>
-          </a:p>
-          <a:p>
-            <a:r>
-              <a:rPr lang="en-US" dirty="0"/>
-              <a:t>Helps reduce costs for Food Companies</a:t>
+              <a:t>Development cost savings of interoperability for solution providers can be passed onto the food companies.</a:t>
             </a:r>
           </a:p>
           <a:p>

</xml_diff>